<commit_message>
Small change to presentation/script.
</commit_message>
<xml_diff>
--- a/docs/presentation/tunefull-presentation-power-point.pptx
+++ b/docs/presentation/tunefull-presentation-power-point.pptx
@@ -13821,6 +13821,21 @@
             <a:r>
               <a:rPr lang="en-US" dirty="0"/>
               <a:t>Being willing to change our ideas from original wireframes</a:t>
+            </a:r>
+          </a:p>
+          <a:p>
+            <a:pPr lvl="1"/>
+            <a:r>
+              <a:rPr lang="en-US"/>
+              <a:t>Being Persistent</a:t>
+            </a:r>
+            <a:endParaRPr lang="en-US" dirty="0"/>
+          </a:p>
+          <a:p>
+            <a:pPr lvl="2"/>
+            <a:r>
+              <a:rPr lang="en-US" dirty="0"/>
+              <a:t>Things take longer than expected</a:t>
             </a:r>
           </a:p>
         </p:txBody>

</xml_diff>

<commit_message>
Updates to presentation and script.
</commit_message>
<xml_diff>
--- a/docs/presentation/tunefull-presentation-power-point.pptx
+++ b/docs/presentation/tunefull-presentation-power-point.pptx
@@ -1718,7 +1718,7 @@
         <a:p>
           <a:r>
             <a:rPr lang="en-US" dirty="0"/>
-            <a:t>Apache HTTP server configured as reverse proxy</a:t>
+            <a:t>Apache HTTPS server configured as reverse proxy</a:t>
           </a:r>
         </a:p>
       </dgm:t>
@@ -2077,7 +2077,7 @@
         <a:lstStyle/>
         <a:p>
           <a:r>
-            <a:rPr lang="en-US"/>
+            <a:rPr lang="en-US" dirty="0"/>
             <a:t>Service Controllers</a:t>
           </a:r>
         </a:p>
@@ -2185,7 +2185,7 @@
         <a:lstStyle/>
         <a:p>
           <a:r>
-            <a:rPr lang="en-US"/>
+            <a:rPr lang="en-US" dirty="0"/>
             <a:t>View Composition &amp; Serialization</a:t>
           </a:r>
         </a:p>
@@ -2257,7 +2257,7 @@
         <a:lstStyle/>
         <a:p>
           <a:r>
-            <a:rPr lang="en-US"/>
+            <a:rPr lang="en-US" dirty="0"/>
             <a:t>Custom View Classes &amp; Interfaces</a:t>
           </a:r>
         </a:p>
@@ -2293,7 +2293,7 @@
         <a:lstStyle/>
         <a:p>
           <a:r>
-            <a:rPr lang="en-US"/>
+            <a:rPr lang="en-US" dirty="0"/>
             <a:t>Authentication</a:t>
           </a:r>
         </a:p>
@@ -2904,7 +2904,23 @@
         <a:p>
           <a:r>
             <a:rPr lang="en-US" dirty="0"/>
-            <a:t>Custom `RecyclerView.Adapter` and `RecyclerView.Holder` classes</a:t>
+            <a:t>Custom </a:t>
+          </a:r>
+          <a:r>
+            <a:rPr lang="en-US" dirty="0" err="1"/>
+            <a:t>RecyclerView.Adapter</a:t>
+          </a:r>
+          <a:r>
+            <a:rPr lang="en-US" dirty="0"/>
+            <a:t> and </a:t>
+          </a:r>
+          <a:r>
+            <a:rPr lang="en-US" dirty="0" err="1"/>
+            <a:t>RecyclerView.Holder</a:t>
+          </a:r>
+          <a:r>
+            <a:rPr lang="en-US" dirty="0"/>
+            <a:t> classes</a:t>
           </a:r>
         </a:p>
       </dgm:t>
@@ -3605,7 +3621,7 @@
           </a:pPr>
           <a:r>
             <a:rPr lang="en-US" sz="1200" kern="1200" dirty="0"/>
-            <a:t>Apache HTTP server configured as reverse proxy</a:t>
+            <a:t>Apache HTTPS server configured as reverse proxy</a:t>
           </a:r>
         </a:p>
         <a:p>
@@ -3784,7 +3800,7 @@
             <a:buChar char="•"/>
           </a:pPr>
           <a:r>
-            <a:rPr lang="en-US" sz="1200" kern="1200"/>
+            <a:rPr lang="en-US" sz="1200" kern="1200" dirty="0"/>
             <a:t>Service Controllers</a:t>
           </a:r>
         </a:p>
@@ -3838,7 +3854,7 @@
             <a:buChar char="•"/>
           </a:pPr>
           <a:r>
-            <a:rPr lang="en-US" sz="1200" kern="1200"/>
+            <a:rPr lang="en-US" sz="1200" kern="1200" dirty="0"/>
             <a:t>View Composition &amp; Serialization</a:t>
           </a:r>
         </a:p>
@@ -3874,7 +3890,7 @@
             <a:buChar char="•"/>
           </a:pPr>
           <a:r>
-            <a:rPr lang="en-US" sz="1200" kern="1200"/>
+            <a:rPr lang="en-US" sz="1200" kern="1200" dirty="0"/>
             <a:t>Custom View Classes &amp; Interfaces</a:t>
           </a:r>
         </a:p>
@@ -3892,7 +3908,7 @@
             <a:buChar char="•"/>
           </a:pPr>
           <a:r>
-            <a:rPr lang="en-US" sz="1200" kern="1200"/>
+            <a:rPr lang="en-US" sz="1200" kern="1200" dirty="0"/>
             <a:t>Authentication</a:t>
           </a:r>
         </a:p>
@@ -4268,7 +4284,23 @@
           </a:pPr>
           <a:r>
             <a:rPr lang="en-US" sz="1100" kern="1200" dirty="0"/>
-            <a:t>Custom `RecyclerView.Adapter` and `RecyclerView.Holder` classes</a:t>
+            <a:t>Custom </a:t>
+          </a:r>
+          <a:r>
+            <a:rPr lang="en-US" sz="1100" kern="1200" dirty="0" err="1"/>
+            <a:t>RecyclerView.Adapter</a:t>
+          </a:r>
+          <a:r>
+            <a:rPr lang="en-US" sz="1100" kern="1200" dirty="0"/>
+            <a:t> and </a:t>
+          </a:r>
+          <a:r>
+            <a:rPr lang="en-US" sz="1100" kern="1200" dirty="0" err="1"/>
+            <a:t>RecyclerView.Holder</a:t>
+          </a:r>
+          <a:r>
+            <a:rPr lang="en-US" sz="1100" kern="1200" dirty="0"/>
+            <a:t> classes</a:t>
           </a:r>
         </a:p>
         <a:p>
@@ -12970,7 +13002,7 @@
             <p:ph idx="1"/>
             <p:extLst>
               <p:ext uri="{D42A27DB-BD31-4B8C-83A1-F6EECF244321}">
-                <p14:modId xmlns:p14="http://schemas.microsoft.com/office/powerpoint/2010/main" val="2163190798"/>
+                <p14:modId xmlns:p14="http://schemas.microsoft.com/office/powerpoint/2010/main" val="2953414483"/>
               </p:ext>
             </p:extLst>
           </p:nvPr>
@@ -13285,7 +13317,7 @@
             <p:ph idx="1"/>
             <p:extLst>
               <p:ext uri="{D42A27DB-BD31-4B8C-83A1-F6EECF244321}">
-                <p14:modId xmlns:p14="http://schemas.microsoft.com/office/powerpoint/2010/main" val="74859684"/>
+                <p14:modId xmlns:p14="http://schemas.microsoft.com/office/powerpoint/2010/main" val="2227971377"/>
               </p:ext>
             </p:extLst>
           </p:nvPr>
@@ -13826,10 +13858,9 @@
           <a:p>
             <a:pPr lvl="1"/>
             <a:r>
-              <a:rPr lang="en-US"/>
+              <a:rPr lang="en-US" dirty="0"/>
               <a:t>Being Persistent</a:t>
             </a:r>
-            <a:endParaRPr lang="en-US" dirty="0"/>
           </a:p>
           <a:p>
             <a:pPr lvl="2"/>

</xml_diff>

<commit_message>
Updated javadocs on website, updated presentation
</commit_message>
<xml_diff>
--- a/docs/presentation/tunefull-presentation-power-point.pptx
+++ b/docs/presentation/tunefull-presentation-power-point.pptx
@@ -11702,7 +11702,7 @@
             <a:pPr lvl="2"/>
             <a:r>
               <a:rPr lang="en-US" dirty="0"/>
-              <a:t>Some client-server communication is failing.</a:t>
+              <a:t>Some client-server communication is not yet working.</a:t>
             </a:r>
           </a:p>
           <a:p>
@@ -11720,28 +11720,21 @@
             <a:pPr lvl="2"/>
             <a:r>
               <a:rPr lang="en-US" dirty="0"/>
-              <a:t>UNM App Contest</a:t>
-            </a:r>
-          </a:p>
-          <a:p>
-            <a:pPr lvl="3"/>
-            <a:r>
-              <a:rPr lang="en-US" dirty="0"/>
               <a:t>Fix issues/bugs</a:t>
             </a:r>
           </a:p>
           <a:p>
-            <a:pPr lvl="3"/>
+            <a:pPr lvl="2"/>
             <a:r>
               <a:rPr lang="en-US" dirty="0"/>
               <a:t>Continue customizing the look and feel of our app</a:t>
             </a:r>
           </a:p>
           <a:p>
-            <a:pPr lvl="3"/>
+            <a:pPr lvl="2"/>
             <a:r>
               <a:rPr lang="en-US" dirty="0"/>
-              <a:t>Have built-in safeguards for Spotify integration</a:t>
+              <a:t>UNM App Contest</a:t>
             </a:r>
           </a:p>
           <a:p>

</xml_diff>